<commit_message>
Update Incorporating VueJS With SharePoint_O365.pptx
</commit_message>
<xml_diff>
--- a/Incorporating VueJS With SharePoint_O365.pptx
+++ b/Incorporating VueJS With SharePoint_O365.pptx
@@ -5,21 +5,20 @@
     <p:sldMasterId id="2147483648" r:id="rId1"/>
   </p:sldMasterIdLst>
   <p:notesMasterIdLst>
-    <p:notesMasterId r:id="rId14"/>
+    <p:notesMasterId r:id="rId13"/>
   </p:notesMasterIdLst>
   <p:sldIdLst>
     <p:sldId id="256" r:id="rId2"/>
-    <p:sldId id="269" r:id="rId3"/>
-    <p:sldId id="264" r:id="rId4"/>
-    <p:sldId id="265" r:id="rId5"/>
-    <p:sldId id="260" r:id="rId6"/>
-    <p:sldId id="261" r:id="rId7"/>
-    <p:sldId id="257" r:id="rId8"/>
-    <p:sldId id="262" r:id="rId9"/>
-    <p:sldId id="266" r:id="rId10"/>
-    <p:sldId id="267" r:id="rId11"/>
-    <p:sldId id="268" r:id="rId12"/>
-    <p:sldId id="263" r:id="rId13"/>
+    <p:sldId id="264" r:id="rId3"/>
+    <p:sldId id="265" r:id="rId4"/>
+    <p:sldId id="260" r:id="rId5"/>
+    <p:sldId id="261" r:id="rId6"/>
+    <p:sldId id="257" r:id="rId7"/>
+    <p:sldId id="262" r:id="rId8"/>
+    <p:sldId id="266" r:id="rId9"/>
+    <p:sldId id="267" r:id="rId10"/>
+    <p:sldId id="268" r:id="rId11"/>
+    <p:sldId id="263" r:id="rId12"/>
   </p:sldIdLst>
   <p:sldSz cx="12192000" cy="6858000"/>
   <p:notesSz cx="6858000" cy="9144000"/>
@@ -344,7 +343,7 @@
           <a:p>
             <a:fld id="{776BFD4A-EC65-43EF-AFAF-279316AC34A3}" type="datetimeFigureOut">
               <a:rPr lang="en-US" smtClean="0"/>
-              <a:t>9/26/2019</a:t>
+              <a:t>1/10/2020</a:t>
             </a:fld>
             <a:endParaRPr lang="en-US"/>
           </a:p>
@@ -947,7 +946,7 @@
             <a:fld id="{5923F103-BC34-4FE4-A40E-EDDEECFDA5D0}" type="datetimeFigureOut">
               <a:rPr lang="en-US" dirty="0"/>
               <a:pPr/>
-              <a:t>9/26/2019</a:t>
+              <a:t>1/10/2020</a:t>
             </a:fld>
             <a:endParaRPr lang="en-US" dirty="0"/>
           </a:p>
@@ -2035,7 +2034,7 @@
           <a:p>
             <a:fld id="{923A1CC3-2375-41D4-9E03-427CAF2A4C1A}" type="datetimeFigureOut">
               <a:rPr lang="en-US" dirty="0"/>
-              <a:t>9/26/2019</a:t>
+              <a:t>1/10/2020</a:t>
             </a:fld>
             <a:endParaRPr lang="en-US" dirty="0"/>
           </a:p>
@@ -3015,7 +3014,7 @@
           <a:p>
             <a:fld id="{AFF16868-8199-4C2C-A5B1-63AEE139F88E}" type="datetimeFigureOut">
               <a:rPr lang="en-US" dirty="0"/>
-              <a:t>9/26/2019</a:t>
+              <a:t>1/10/2020</a:t>
             </a:fld>
             <a:endParaRPr lang="en-US" dirty="0"/>
           </a:p>
@@ -4149,7 +4148,7 @@
           <a:p>
             <a:fld id="{AAD9FF7F-6988-44CC-821B-644E70CD2F73}" type="datetimeFigureOut">
               <a:rPr lang="en-US" dirty="0"/>
-              <a:t>9/26/2019</a:t>
+              <a:t>1/10/2020</a:t>
             </a:fld>
             <a:endParaRPr lang="en-US" dirty="0"/>
           </a:p>
@@ -5182,7 +5181,7 @@
           <a:p>
             <a:fld id="{5C12C299-16B2-4475-990D-751901EACC14}" type="datetimeFigureOut">
               <a:rPr lang="en-US" dirty="0"/>
-              <a:t>9/26/2019</a:t>
+              <a:t>1/10/2020</a:t>
             </a:fld>
             <a:endParaRPr lang="en-US" dirty="0"/>
           </a:p>
@@ -5842,7 +5841,7 @@
           <a:p>
             <a:fld id="{9FE86839-B9D8-4651-8783-F325ECE74E65}" type="datetimeFigureOut">
               <a:rPr lang="en-US" dirty="0"/>
-              <a:t>9/26/2019</a:t>
+              <a:t>1/10/2020</a:t>
             </a:fld>
             <a:endParaRPr lang="en-US" dirty="0"/>
           </a:p>
@@ -6703,7 +6702,7 @@
           <a:p>
             <a:fld id="{FD484F64-32F6-45C5-931F-ADC1662401D0}" type="datetimeFigureOut">
               <a:rPr lang="en-US" dirty="0"/>
-              <a:t>9/26/2019</a:t>
+              <a:t>1/10/2020</a:t>
             </a:fld>
             <a:endParaRPr lang="en-US" dirty="0"/>
           </a:p>
@@ -6893,7 +6892,7 @@
           <a:p>
             <a:fld id="{53086D93-FCAC-47E0-A2EE-787E62CA814C}" type="datetimeFigureOut">
               <a:rPr lang="en-US" dirty="0"/>
-              <a:t>9/26/2019</a:t>
+              <a:t>1/10/2020</a:t>
             </a:fld>
             <a:endParaRPr lang="en-US" dirty="0"/>
           </a:p>
@@ -7865,7 +7864,7 @@
           <a:p>
             <a:fld id="{CDA879A6-0FD0-4734-A311-86BFCA472E6E}" type="datetimeFigureOut">
               <a:rPr lang="en-US" dirty="0"/>
-              <a:t>9/26/2019</a:t>
+              <a:t>1/10/2020</a:t>
             </a:fld>
             <a:endParaRPr lang="en-US" dirty="0"/>
           </a:p>
@@ -8076,7 +8075,7 @@
           <a:p>
             <a:fld id="{19C9CA7B-DFD4-44B5-8C60-D14B8CD1FB59}" type="datetimeFigureOut">
               <a:rPr lang="en-US" dirty="0"/>
-              <a:t>9/26/2019</a:t>
+              <a:t>1/10/2020</a:t>
             </a:fld>
             <a:endParaRPr lang="en-US" dirty="0"/>
           </a:p>
@@ -9110,7 +9109,7 @@
           <a:p>
             <a:fld id="{F34E6425-0181-43F2-84FC-787E803FD2F8}" type="datetimeFigureOut">
               <a:rPr lang="en-US" dirty="0"/>
-              <a:t>9/26/2019</a:t>
+              <a:t>1/10/2020</a:t>
             </a:fld>
             <a:endParaRPr lang="en-US" dirty="0"/>
           </a:p>
@@ -9382,7 +9381,7 @@
           <a:p>
             <a:fld id="{3BDB8791-F1B0-41E7-B7FD-A781E65C4266}" type="datetimeFigureOut">
               <a:rPr lang="en-US" dirty="0"/>
-              <a:t>9/26/2019</a:t>
+              <a:t>1/10/2020</a:t>
             </a:fld>
             <a:endParaRPr lang="en-US" dirty="0"/>
           </a:p>
@@ -9792,7 +9791,7 @@
           <a:p>
             <a:fld id="{5FDD63B2-E120-4ED8-B27B-C685F510A5FE}" type="datetimeFigureOut">
               <a:rPr lang="en-US" dirty="0"/>
-              <a:t>9/26/2019</a:t>
+              <a:t>1/10/2020</a:t>
             </a:fld>
             <a:endParaRPr lang="en-US" dirty="0"/>
           </a:p>
@@ -9919,7 +9918,7 @@
           <a:p>
             <a:fld id="{7AA18ACC-A947-437B-A130-35BD54FDF1E9}" type="datetimeFigureOut">
               <a:rPr lang="en-US" dirty="0"/>
-              <a:t>9/26/2019</a:t>
+              <a:t>1/10/2020</a:t>
             </a:fld>
             <a:endParaRPr lang="en-US" dirty="0"/>
           </a:p>
@@ -10014,7 +10013,7 @@
           <a:p>
             <a:fld id="{7C8D7E02-BCB8-4D50-A234-369438C08659}" type="datetimeFigureOut">
               <a:rPr lang="en-US" dirty="0"/>
-              <a:t>9/26/2019</a:t>
+              <a:t>1/10/2020</a:t>
             </a:fld>
             <a:endParaRPr lang="en-US" dirty="0"/>
           </a:p>
@@ -11095,7 +11094,7 @@
           <a:p>
             <a:fld id="{76E86A4C-8E40-4F87-A4F0-01A0687C5742}" type="datetimeFigureOut">
               <a:rPr lang="en-US" dirty="0"/>
-              <a:t>9/26/2019</a:t>
+              <a:t>1/10/2020</a:t>
             </a:fld>
             <a:endParaRPr lang="en-US" dirty="0"/>
           </a:p>
@@ -12203,7 +12202,7 @@
           <a:p>
             <a:fld id="{35E72C73-2D91-4E12-BA25-F0AA0C03599B}" type="datetimeFigureOut">
               <a:rPr lang="en-US" dirty="0"/>
-              <a:t>9/26/2019</a:t>
+              <a:t>1/10/2020</a:t>
             </a:fld>
             <a:endParaRPr lang="en-US" dirty="0"/>
           </a:p>
@@ -13200,7 +13199,7 @@
           <a:p>
             <a:fld id="{2BE451C3-0FF4-47C4-B829-773ADF60F88C}" type="datetimeFigureOut">
               <a:rPr lang="en-US" dirty="0"/>
-              <a:t>9/26/2019</a:t>
+              <a:t>1/10/2020</a:t>
             </a:fld>
             <a:endParaRPr lang="en-US" dirty="0"/>
           </a:p>
@@ -13859,185 +13858,6 @@
           <p:cNvPr id="2" name="Title 1">
             <a:extLst>
               <a:ext uri="{FF2B5EF4-FFF2-40B4-BE49-F238E27FC236}">
-                <a16:creationId xmlns:a16="http://schemas.microsoft.com/office/drawing/2014/main" id="{A81A99B7-EDA1-423F-9683-1DCA39190D8B}"/>
-              </a:ext>
-            </a:extLst>
-          </p:cNvPr>
-          <p:cNvSpPr>
-            <a:spLocks noGrp="1"/>
-          </p:cNvSpPr>
-          <p:nvPr>
-            <p:ph type="title"/>
-          </p:nvPr>
-        </p:nvSpPr>
-        <p:spPr/>
-        <p:txBody>
-          <a:bodyPr/>
-          <a:lstStyle/>
-          <a:p>
-            <a:r>
-              <a:rPr lang="en-US" dirty="0"/>
-              <a:t>Yeoman</a:t>
-            </a:r>
-          </a:p>
-        </p:txBody>
-      </p:sp>
-      <p:sp>
-        <p:nvSpPr>
-          <p:cNvPr id="3" name="Content Placeholder 2">
-            <a:extLst>
-              <a:ext uri="{FF2B5EF4-FFF2-40B4-BE49-F238E27FC236}">
-                <a16:creationId xmlns:a16="http://schemas.microsoft.com/office/drawing/2014/main" id="{EA4FBC21-0BA4-4C86-BF23-23883ED04F8E}"/>
-              </a:ext>
-            </a:extLst>
-          </p:cNvPr>
-          <p:cNvSpPr>
-            <a:spLocks noGrp="1"/>
-          </p:cNvSpPr>
-          <p:nvPr>
-            <p:ph idx="1"/>
-          </p:nvPr>
-        </p:nvSpPr>
-        <p:spPr/>
-        <p:txBody>
-          <a:bodyPr>
-            <a:normAutofit fontScale="62500" lnSpcReduction="20000"/>
-          </a:bodyPr>
-          <a:lstStyle/>
-          <a:p>
-            <a:r>
-              <a:rPr lang="en-US" b="1" dirty="0"/>
-              <a:t>What's Yeoman?</a:t>
-            </a:r>
-          </a:p>
-          <a:p>
-            <a:r>
-              <a:rPr lang="en-US" dirty="0"/>
-              <a:t>Yeoman helps you to kickstart new projects, prescribing best practices and tools to help you stay productive.</a:t>
-            </a:r>
-          </a:p>
-          <a:p>
-            <a:r>
-              <a:rPr lang="en-US" dirty="0"/>
-              <a:t>To do so, we provide a generator ecosystem. A generator is basically a plugin that can be run with the `</a:t>
-            </a:r>
-            <a:r>
-              <a:rPr lang="en-US" dirty="0" err="1"/>
-              <a:t>yo</a:t>
-            </a:r>
-            <a:r>
-              <a:rPr lang="en-US" dirty="0"/>
-              <a:t>` command to scaffold complete projects or useful parts.</a:t>
-            </a:r>
-          </a:p>
-          <a:p>
-            <a:r>
-              <a:rPr lang="en-US" dirty="0"/>
-              <a:t>Through our official Generators, we promote the "Yeoman workflow". This workflow is a robust and opinionated client-side stack, comprising tools and frameworks that can help developers quickly build beautiful web applications. We take care of providing everything needed to get started without any of the normal headaches associated with a manual setup.</a:t>
-            </a:r>
-          </a:p>
-          <a:p>
-            <a:r>
-              <a:rPr lang="en-US" dirty="0"/>
-              <a:t>With a modular architecture that can scale out of the box, we leverage the success and lessons learned from several open-source communities to ensure that developers use it as intelligently as possible.</a:t>
-            </a:r>
-          </a:p>
-          <a:p>
-            <a:r>
-              <a:rPr lang="en-US" dirty="0"/>
-              <a:t>As firm believers in good documentation and well thought out build processes, Yeoman includes support for linting, testing, minification and much more, so developers can focus on solutions rather than worrying about the little things.</a:t>
-            </a:r>
-          </a:p>
-          <a:p>
-            <a:r>
-              <a:rPr lang="en-US" b="1" dirty="0"/>
-              <a:t>Tools</a:t>
-            </a:r>
-          </a:p>
-          <a:p>
-            <a:r>
-              <a:rPr lang="en-US" dirty="0"/>
-              <a:t>The Yeoman workflow comprises three types of tools for improving your productivity and satisfaction when building a web app: the scaffolding tool (</a:t>
-            </a:r>
-            <a:r>
-              <a:rPr lang="en-US" dirty="0" err="1"/>
-              <a:t>yo</a:t>
-            </a:r>
-            <a:r>
-              <a:rPr lang="en-US" dirty="0"/>
-              <a:t>), the build tool (Gulp, Grunt </a:t>
-            </a:r>
-            <a:r>
-              <a:rPr lang="en-US" dirty="0" err="1"/>
-              <a:t>etc</a:t>
-            </a:r>
-            <a:r>
-              <a:rPr lang="en-US" dirty="0"/>
-              <a:t>) and the package manager (like </a:t>
-            </a:r>
-            <a:r>
-              <a:rPr lang="en-US" dirty="0" err="1"/>
-              <a:t>npm</a:t>
-            </a:r>
-            <a:r>
-              <a:rPr lang="en-US" dirty="0"/>
-              <a:t> and Bower).</a:t>
-            </a:r>
-          </a:p>
-          <a:p>
-            <a:r>
-              <a:rPr lang="en-US" sz="1600" dirty="0"/>
-              <a:t>SOURCE:</a:t>
-            </a:r>
-            <a:r>
-              <a:rPr lang="en-US" dirty="0"/>
-              <a:t> </a:t>
-            </a:r>
-            <a:r>
-              <a:rPr lang="en-US" dirty="0">
-                <a:hlinkClick r:id="rId2"/>
-              </a:rPr>
-              <a:t>https://yeoman.io</a:t>
-            </a:r>
-            <a:endParaRPr lang="en-US" dirty="0"/>
-          </a:p>
-        </p:txBody>
-      </p:sp>
-    </p:spTree>
-    <p:extLst>
-      <p:ext uri="{BB962C8B-B14F-4D97-AF65-F5344CB8AC3E}">
-        <p14:creationId xmlns:p14="http://schemas.microsoft.com/office/powerpoint/2010/main" val="3810153021"/>
-      </p:ext>
-    </p:extLst>
-  </p:cSld>
-  <p:clrMapOvr>
-    <a:masterClrMapping/>
-  </p:clrMapOvr>
-</p:sld>
-</file>
-
-<file path=ppt/slides/slide11.xml><?xml version="1.0" encoding="utf-8"?>
-<p:sld xmlns:a="http://schemas.openxmlformats.org/drawingml/2006/main" xmlns:r="http://schemas.openxmlformats.org/officeDocument/2006/relationships" xmlns:p="http://schemas.openxmlformats.org/presentationml/2006/main">
-  <p:cSld>
-    <p:spTree>
-      <p:nvGrpSpPr>
-        <p:cNvPr id="1" name=""/>
-        <p:cNvGrpSpPr/>
-        <p:nvPr/>
-      </p:nvGrpSpPr>
-      <p:grpSpPr>
-        <a:xfrm>
-          <a:off x="0" y="0"/>
-          <a:ext cx="0" cy="0"/>
-          <a:chOff x="0" y="0"/>
-          <a:chExt cx="0" cy="0"/>
-        </a:xfrm>
-      </p:grpSpPr>
-      <p:sp>
-        <p:nvSpPr>
-          <p:cNvPr id="2" name="Title 1">
-            <a:extLst>
-              <a:ext uri="{FF2B5EF4-FFF2-40B4-BE49-F238E27FC236}">
                 <a16:creationId xmlns:a16="http://schemas.microsoft.com/office/drawing/2014/main" id="{3AFE2AEB-D458-407B-90C6-63AE30A32FEE}"/>
               </a:ext>
             </a:extLst>
@@ -14198,7 +14018,7 @@
 </p:sld>
 </file>
 
-<file path=ppt/slides/slide12.xml><?xml version="1.0" encoding="utf-8"?>
+<file path=ppt/slides/slide11.xml><?xml version="1.0" encoding="utf-8"?>
 <p:sld xmlns:a="http://schemas.openxmlformats.org/drawingml/2006/main" xmlns:r="http://schemas.openxmlformats.org/officeDocument/2006/relationships" xmlns:p="http://schemas.openxmlformats.org/presentationml/2006/main">
   <p:cSld>
     <p:spTree>
@@ -14303,429 +14123,6 @@
           <a:chExt cx="0" cy="0"/>
         </a:xfrm>
       </p:grpSpPr>
-      <p:pic>
-        <p:nvPicPr>
-          <p:cNvPr id="5" name="Picture 4">
-            <a:extLst>
-              <a:ext uri="{FF2B5EF4-FFF2-40B4-BE49-F238E27FC236}">
-                <a16:creationId xmlns:a16="http://schemas.microsoft.com/office/drawing/2014/main" id="{803688C1-E477-42F0-B810-01679803E5D0}"/>
-              </a:ext>
-            </a:extLst>
-          </p:cNvPr>
-          <p:cNvPicPr>
-            <a:picLocks noChangeAspect="1"/>
-          </p:cNvPicPr>
-          <p:nvPr/>
-        </p:nvPicPr>
-        <p:blipFill>
-          <a:blip r:embed="rId2">
-            <a:extLst>
-              <a:ext uri="{28A0092B-C50C-407E-A947-70E740481C1C}">
-                <a14:useLocalDpi xmlns:a14="http://schemas.microsoft.com/office/drawing/2010/main" val="0"/>
-              </a:ext>
-            </a:extLst>
-          </a:blip>
-          <a:stretch>
-            <a:fillRect/>
-          </a:stretch>
-        </p:blipFill>
-        <p:spPr>
-          <a:xfrm>
-            <a:off x="1428901" y="4620792"/>
-            <a:ext cx="2113902" cy="1048495"/>
-          </a:xfrm>
-          <a:prstGeom prst="rect">
-            <a:avLst/>
-          </a:prstGeom>
-        </p:spPr>
-      </p:pic>
-      <p:pic>
-        <p:nvPicPr>
-          <p:cNvPr id="7" name="Picture 6">
-            <a:extLst>
-              <a:ext uri="{FF2B5EF4-FFF2-40B4-BE49-F238E27FC236}">
-                <a16:creationId xmlns:a16="http://schemas.microsoft.com/office/drawing/2014/main" id="{CA8BB850-8FEA-4244-9036-578E6C471161}"/>
-              </a:ext>
-            </a:extLst>
-          </p:cNvPr>
-          <p:cNvPicPr>
-            <a:picLocks noChangeAspect="1"/>
-          </p:cNvPicPr>
-          <p:nvPr/>
-        </p:nvPicPr>
-        <p:blipFill>
-          <a:blip r:embed="rId3">
-            <a:extLst>
-              <a:ext uri="{28A0092B-C50C-407E-A947-70E740481C1C}">
-                <a14:useLocalDpi xmlns:a14="http://schemas.microsoft.com/office/drawing/2010/main" val="0"/>
-              </a:ext>
-            </a:extLst>
-          </a:blip>
-          <a:stretch>
-            <a:fillRect/>
-          </a:stretch>
-        </p:blipFill>
-        <p:spPr>
-          <a:xfrm>
-            <a:off x="7146528" y="1772971"/>
-            <a:ext cx="2276151" cy="855832"/>
-          </a:xfrm>
-          <a:prstGeom prst="rect">
-            <a:avLst/>
-          </a:prstGeom>
-        </p:spPr>
-      </p:pic>
-      <p:pic>
-        <p:nvPicPr>
-          <p:cNvPr id="9" name="Picture 8">
-            <a:extLst>
-              <a:ext uri="{FF2B5EF4-FFF2-40B4-BE49-F238E27FC236}">
-                <a16:creationId xmlns:a16="http://schemas.microsoft.com/office/drawing/2014/main" id="{CE2088F8-1635-4575-B885-C6E461749236}"/>
-              </a:ext>
-            </a:extLst>
-          </p:cNvPr>
-          <p:cNvPicPr>
-            <a:picLocks noChangeAspect="1"/>
-          </p:cNvPicPr>
-          <p:nvPr/>
-        </p:nvPicPr>
-        <p:blipFill>
-          <a:blip r:embed="rId4">
-            <a:extLst>
-              <a:ext uri="{28A0092B-C50C-407E-A947-70E740481C1C}">
-                <a14:useLocalDpi xmlns:a14="http://schemas.microsoft.com/office/drawing/2010/main" val="0"/>
-              </a:ext>
-            </a:extLst>
-          </a:blip>
-          <a:stretch>
-            <a:fillRect/>
-          </a:stretch>
-        </p:blipFill>
-        <p:spPr>
-          <a:xfrm>
-            <a:off x="7999499" y="4731026"/>
-            <a:ext cx="2381582" cy="685896"/>
-          </a:xfrm>
-          <a:prstGeom prst="rect">
-            <a:avLst/>
-          </a:prstGeom>
-        </p:spPr>
-      </p:pic>
-      <p:pic>
-        <p:nvPicPr>
-          <p:cNvPr id="11" name="Picture 10">
-            <a:extLst>
-              <a:ext uri="{FF2B5EF4-FFF2-40B4-BE49-F238E27FC236}">
-                <a16:creationId xmlns:a16="http://schemas.microsoft.com/office/drawing/2014/main" id="{D64F42DA-1986-4767-9743-A4BBECEF1279}"/>
-              </a:ext>
-            </a:extLst>
-          </p:cNvPr>
-          <p:cNvPicPr>
-            <a:picLocks noChangeAspect="1"/>
-          </p:cNvPicPr>
-          <p:nvPr/>
-        </p:nvPicPr>
-        <p:blipFill>
-          <a:blip r:embed="rId5">
-            <a:extLst>
-              <a:ext uri="{28A0092B-C50C-407E-A947-70E740481C1C}">
-                <a14:useLocalDpi xmlns:a14="http://schemas.microsoft.com/office/drawing/2010/main" val="0"/>
-              </a:ext>
-            </a:extLst>
-          </a:blip>
-          <a:stretch>
-            <a:fillRect/>
-          </a:stretch>
-        </p:blipFill>
-        <p:spPr>
-          <a:xfrm>
-            <a:off x="3100258" y="1468171"/>
-            <a:ext cx="1705291" cy="1691649"/>
-          </a:xfrm>
-          <a:prstGeom prst="rect">
-            <a:avLst/>
-          </a:prstGeom>
-        </p:spPr>
-      </p:pic>
-      <p:pic>
-        <p:nvPicPr>
-          <p:cNvPr id="13" name="Picture 12">
-            <a:extLst>
-              <a:ext uri="{FF2B5EF4-FFF2-40B4-BE49-F238E27FC236}">
-                <a16:creationId xmlns:a16="http://schemas.microsoft.com/office/drawing/2014/main" id="{CE48F32C-5D37-4CDC-A389-41FBDDAB62A4}"/>
-              </a:ext>
-            </a:extLst>
-          </p:cNvPr>
-          <p:cNvPicPr>
-            <a:picLocks noChangeAspect="1"/>
-          </p:cNvPicPr>
-          <p:nvPr/>
-        </p:nvPicPr>
-        <p:blipFill>
-          <a:blip r:embed="rId6">
-            <a:extLst>
-              <a:ext uri="{28A0092B-C50C-407E-A947-70E740481C1C}">
-                <a14:useLocalDpi xmlns:a14="http://schemas.microsoft.com/office/drawing/2010/main" val="0"/>
-              </a:ext>
-            </a:extLst>
-          </a:blip>
-          <a:stretch>
-            <a:fillRect/>
-          </a:stretch>
-        </p:blipFill>
-        <p:spPr>
-          <a:xfrm>
-            <a:off x="4905375" y="4478662"/>
-            <a:ext cx="2381250" cy="1190625"/>
-          </a:xfrm>
-          <a:prstGeom prst="rect">
-            <a:avLst/>
-          </a:prstGeom>
-        </p:spPr>
-      </p:pic>
-      <p:sp>
-        <p:nvSpPr>
-          <p:cNvPr id="14" name="TextBox 13">
-            <a:extLst>
-              <a:ext uri="{FF2B5EF4-FFF2-40B4-BE49-F238E27FC236}">
-                <a16:creationId xmlns:a16="http://schemas.microsoft.com/office/drawing/2014/main" id="{7F4651AE-A506-45D0-90AE-D12E742802CC}"/>
-              </a:ext>
-            </a:extLst>
-          </p:cNvPr>
-          <p:cNvSpPr txBox="1"/>
-          <p:nvPr/>
-        </p:nvSpPr>
-        <p:spPr>
-          <a:xfrm>
-            <a:off x="0" y="923113"/>
-            <a:ext cx="12192000" cy="461665"/>
-          </a:xfrm>
-          <a:prstGeom prst="rect">
-            <a:avLst/>
-          </a:prstGeom>
-          <a:noFill/>
-          <a:ln>
-            <a:noFill/>
-          </a:ln>
-        </p:spPr>
-        <p:txBody>
-          <a:bodyPr wrap="square" rtlCol="0">
-            <a:spAutoFit/>
-          </a:bodyPr>
-          <a:lstStyle/>
-          <a:p>
-            <a:pPr algn="ctr"/>
-            <a:r>
-              <a:rPr lang="en-US" sz="2400" b="1" dirty="0">
-                <a:solidFill>
-                  <a:schemeClr val="bg1">
-                    <a:lumMod val="75000"/>
-                  </a:schemeClr>
-                </a:solidFill>
-              </a:rPr>
-              <a:t>Platinum</a:t>
-            </a:r>
-            <a:r>
-              <a:rPr lang="en-US" sz="2400" b="1" dirty="0"/>
-              <a:t> Sponsors</a:t>
-            </a:r>
-          </a:p>
-        </p:txBody>
-      </p:sp>
-      <p:sp>
-        <p:nvSpPr>
-          <p:cNvPr id="15" name="TextBox 14">
-            <a:extLst>
-              <a:ext uri="{FF2B5EF4-FFF2-40B4-BE49-F238E27FC236}">
-                <a16:creationId xmlns:a16="http://schemas.microsoft.com/office/drawing/2014/main" id="{AE460843-D3B2-4A04-99B8-EBD632ED69EB}"/>
-              </a:ext>
-            </a:extLst>
-          </p:cNvPr>
-          <p:cNvSpPr txBox="1"/>
-          <p:nvPr/>
-        </p:nvSpPr>
-        <p:spPr>
-          <a:xfrm>
-            <a:off x="0" y="3767311"/>
-            <a:ext cx="12192000" cy="461665"/>
-          </a:xfrm>
-          <a:prstGeom prst="rect">
-            <a:avLst/>
-          </a:prstGeom>
-          <a:noFill/>
-        </p:spPr>
-        <p:txBody>
-          <a:bodyPr wrap="square" rtlCol="0">
-            <a:spAutoFit/>
-          </a:bodyPr>
-          <a:lstStyle/>
-          <a:p>
-            <a:pPr algn="ctr"/>
-            <a:r>
-              <a:rPr lang="en-US" sz="2400" b="1" dirty="0">
-                <a:solidFill>
-                  <a:schemeClr val="accent4">
-                    <a:lumMod val="60000"/>
-                    <a:lumOff val="40000"/>
-                  </a:schemeClr>
-                </a:solidFill>
-              </a:rPr>
-              <a:t>Gold</a:t>
-            </a:r>
-            <a:r>
-              <a:rPr lang="en-US" sz="2400" b="1" dirty="0"/>
-              <a:t> Sponsors</a:t>
-            </a:r>
-          </a:p>
-        </p:txBody>
-      </p:sp>
-      <p:sp>
-        <p:nvSpPr>
-          <p:cNvPr id="20" name="TextBox 19">
-            <a:extLst>
-              <a:ext uri="{FF2B5EF4-FFF2-40B4-BE49-F238E27FC236}">
-                <a16:creationId xmlns:a16="http://schemas.microsoft.com/office/drawing/2014/main" id="{8FBFE65C-5BEB-4C42-A1B0-B710FB3EE005}"/>
-              </a:ext>
-            </a:extLst>
-          </p:cNvPr>
-          <p:cNvSpPr txBox="1"/>
-          <p:nvPr/>
-        </p:nvSpPr>
-        <p:spPr>
-          <a:xfrm>
-            <a:off x="0" y="78377"/>
-            <a:ext cx="12192000" cy="646331"/>
-          </a:xfrm>
-          <a:prstGeom prst="rect">
-            <a:avLst/>
-          </a:prstGeom>
-          <a:noFill/>
-        </p:spPr>
-        <p:txBody>
-          <a:bodyPr wrap="square" rtlCol="0">
-            <a:spAutoFit/>
-          </a:bodyPr>
-          <a:lstStyle/>
-          <a:p>
-            <a:r>
-              <a:rPr lang="en-US" sz="3600" b="1" dirty="0"/>
-              <a:t>Thank our sponsors!</a:t>
-            </a:r>
-          </a:p>
-        </p:txBody>
-      </p:sp>
-      <p:cxnSp>
-        <p:nvCxnSpPr>
-          <p:cNvPr id="24" name="Straight Connector 23">
-            <a:extLst>
-              <a:ext uri="{FF2B5EF4-FFF2-40B4-BE49-F238E27FC236}">
-                <a16:creationId xmlns:a16="http://schemas.microsoft.com/office/drawing/2014/main" id="{48C25490-75F9-48F3-9207-1C21FC2D075A}"/>
-              </a:ext>
-            </a:extLst>
-          </p:cNvPr>
-          <p:cNvCxnSpPr/>
-          <p:nvPr/>
-        </p:nvCxnSpPr>
-        <p:spPr>
-          <a:xfrm>
-            <a:off x="0" y="1376069"/>
-            <a:ext cx="12192000" cy="0"/>
-          </a:xfrm>
-          <a:prstGeom prst="line">
-            <a:avLst/>
-          </a:prstGeom>
-          <a:ln w="15875">
-            <a:solidFill>
-              <a:schemeClr val="tx1"/>
-            </a:solidFill>
-          </a:ln>
-        </p:spPr>
-        <p:style>
-          <a:lnRef idx="1">
-            <a:schemeClr val="accent1"/>
-          </a:lnRef>
-          <a:fillRef idx="0">
-            <a:schemeClr val="accent1"/>
-          </a:fillRef>
-          <a:effectRef idx="0">
-            <a:schemeClr val="accent1"/>
-          </a:effectRef>
-          <a:fontRef idx="minor">
-            <a:schemeClr val="tx1"/>
-          </a:fontRef>
-        </p:style>
-      </p:cxnSp>
-      <p:cxnSp>
-        <p:nvCxnSpPr>
-          <p:cNvPr id="25" name="Straight Connector 24">
-            <a:extLst>
-              <a:ext uri="{FF2B5EF4-FFF2-40B4-BE49-F238E27FC236}">
-                <a16:creationId xmlns:a16="http://schemas.microsoft.com/office/drawing/2014/main" id="{27E711C9-B1B9-4075-92E8-787AF0A58888}"/>
-              </a:ext>
-            </a:extLst>
-          </p:cNvPr>
-          <p:cNvCxnSpPr/>
-          <p:nvPr/>
-        </p:nvCxnSpPr>
-        <p:spPr>
-          <a:xfrm>
-            <a:off x="0" y="4228976"/>
-            <a:ext cx="12192000" cy="0"/>
-          </a:xfrm>
-          <a:prstGeom prst="line">
-            <a:avLst/>
-          </a:prstGeom>
-          <a:ln w="15875">
-            <a:solidFill>
-              <a:schemeClr val="tx1"/>
-            </a:solidFill>
-          </a:ln>
-        </p:spPr>
-        <p:style>
-          <a:lnRef idx="1">
-            <a:schemeClr val="accent1"/>
-          </a:lnRef>
-          <a:fillRef idx="0">
-            <a:schemeClr val="accent1"/>
-          </a:fillRef>
-          <a:effectRef idx="0">
-            <a:schemeClr val="accent1"/>
-          </a:effectRef>
-          <a:fontRef idx="minor">
-            <a:schemeClr val="tx1"/>
-          </a:fontRef>
-        </p:style>
-      </p:cxnSp>
-    </p:spTree>
-    <p:extLst>
-      <p:ext uri="{BB962C8B-B14F-4D97-AF65-F5344CB8AC3E}">
-        <p14:creationId xmlns:p14="http://schemas.microsoft.com/office/powerpoint/2010/main" val="187686110"/>
-      </p:ext>
-    </p:extLst>
-  </p:cSld>
-  <p:clrMapOvr>
-    <a:masterClrMapping/>
-  </p:clrMapOvr>
-</p:sld>
-</file>
-
-<file path=ppt/slides/slide3.xml><?xml version="1.0" encoding="utf-8"?>
-<p:sld xmlns:a="http://schemas.openxmlformats.org/drawingml/2006/main" xmlns:r="http://schemas.openxmlformats.org/officeDocument/2006/relationships" xmlns:p="http://schemas.openxmlformats.org/presentationml/2006/main">
-  <p:cSld>
-    <p:spTree>
-      <p:nvGrpSpPr>
-        <p:cNvPr id="1" name=""/>
-        <p:cNvGrpSpPr/>
-        <p:nvPr/>
-      </p:nvGrpSpPr>
-      <p:grpSpPr>
-        <a:xfrm>
-          <a:off x="0" y="0"/>
-          <a:ext cx="0" cy="0"/>
-          <a:chOff x="0" y="0"/>
-          <a:chExt cx="0" cy="0"/>
-        </a:xfrm>
-      </p:grpSpPr>
       <p:sp>
         <p:nvSpPr>
           <p:cNvPr id="2" name="Title 1">
@@ -14819,7 +14216,7 @@
           <a:p>
             <a:r>
               <a:rPr lang="en-US" dirty="0"/>
-              <a:t>Company: Resource Management Concepts (RMC)</a:t>
+              <a:t>Company: CACI</a:t>
             </a:r>
           </a:p>
         </p:txBody>
@@ -14837,7 +14234,7 @@
 </p:sld>
 </file>
 
-<file path=ppt/slides/slide4.xml><?xml version="1.0" encoding="utf-8"?>
+<file path=ppt/slides/slide3.xml><?xml version="1.0" encoding="utf-8"?>
 <p:sld xmlns:a="http://schemas.openxmlformats.org/drawingml/2006/main" xmlns:r="http://schemas.openxmlformats.org/officeDocument/2006/relationships" xmlns:p="http://schemas.openxmlformats.org/presentationml/2006/main">
   <p:cSld>
     <p:spTree>
@@ -14951,7 +14348,7 @@
 </p:sld>
 </file>
 
-<file path=ppt/slides/slide5.xml><?xml version="1.0" encoding="utf-8"?>
+<file path=ppt/slides/slide4.xml><?xml version="1.0" encoding="utf-8"?>
 <p:sld xmlns:a="http://schemas.openxmlformats.org/drawingml/2006/main" xmlns:r="http://schemas.openxmlformats.org/officeDocument/2006/relationships" xmlns:p="http://schemas.openxmlformats.org/presentationml/2006/main">
   <p:cSld>
     <p:spTree>
@@ -15200,7 +14597,7 @@
 </p:sld>
 </file>
 
-<file path=ppt/slides/slide6.xml><?xml version="1.0" encoding="utf-8"?>
+<file path=ppt/slides/slide5.xml><?xml version="1.0" encoding="utf-8"?>
 <p:sld xmlns:a="http://schemas.openxmlformats.org/drawingml/2006/main" xmlns:r="http://schemas.openxmlformats.org/officeDocument/2006/relationships" xmlns:p="http://schemas.openxmlformats.org/presentationml/2006/main">
   <p:cSld>
     <p:spTree>
@@ -15330,7 +14727,7 @@
 </p:sld>
 </file>
 
-<file path=ppt/slides/slide7.xml><?xml version="1.0" encoding="utf-8"?>
+<file path=ppt/slides/slide6.xml><?xml version="1.0" encoding="utf-8"?>
 <p:sld xmlns:a="http://schemas.openxmlformats.org/drawingml/2006/main" xmlns:r="http://schemas.openxmlformats.org/officeDocument/2006/relationships" xmlns:p="http://schemas.openxmlformats.org/presentationml/2006/main">
   <p:cSld>
     <p:spTree>
@@ -15499,7 +14896,7 @@
 </p:sld>
 </file>
 
-<file path=ppt/slides/slide8.xml><?xml version="1.0" encoding="utf-8"?>
+<file path=ppt/slides/slide7.xml><?xml version="1.0" encoding="utf-8"?>
 <p:sld xmlns:a="http://schemas.openxmlformats.org/drawingml/2006/main" xmlns:r="http://schemas.openxmlformats.org/officeDocument/2006/relationships" xmlns:p="http://schemas.openxmlformats.org/presentationml/2006/main">
   <p:cSld>
     <p:spTree>
@@ -15591,7 +14988,7 @@
 </p:sld>
 </file>
 
-<file path=ppt/slides/slide9.xml><?xml version="1.0" encoding="utf-8"?>
+<file path=ppt/slides/slide8.xml><?xml version="1.0" encoding="utf-8"?>
 <p:sld xmlns:a="http://schemas.openxmlformats.org/drawingml/2006/main" xmlns:r="http://schemas.openxmlformats.org/officeDocument/2006/relationships" xmlns:p="http://schemas.openxmlformats.org/presentationml/2006/main">
   <p:cSld>
     <p:spTree>
@@ -15867,7 +15264,7 @@
                 </a:solidFill>
                 <a:latin typeface="Segoe UI" panose="020B0502040204020203" pitchFamily="34" charset="0"/>
               </a:rPr>
-              <a:t>It is framework-agnostic. You can use any JavaScript framework that you like: React, Handlebars, Knockout, Angular, and more.</a:t>
+              <a:t>It is framework-agnostic. You can use any JavaScript framework that you like: Vue, React, Handlebars, Knockout, Angular, and more.</a:t>
             </a:r>
           </a:p>
           <a:p>
@@ -15994,6 +15391,185 @@
     <p:extLst>
       <p:ext uri="{BB962C8B-B14F-4D97-AF65-F5344CB8AC3E}">
         <p14:creationId xmlns:p14="http://schemas.microsoft.com/office/powerpoint/2010/main" val="864574767"/>
+      </p:ext>
+    </p:extLst>
+  </p:cSld>
+  <p:clrMapOvr>
+    <a:masterClrMapping/>
+  </p:clrMapOvr>
+</p:sld>
+</file>
+
+<file path=ppt/slides/slide9.xml><?xml version="1.0" encoding="utf-8"?>
+<p:sld xmlns:a="http://schemas.openxmlformats.org/drawingml/2006/main" xmlns:r="http://schemas.openxmlformats.org/officeDocument/2006/relationships" xmlns:p="http://schemas.openxmlformats.org/presentationml/2006/main">
+  <p:cSld>
+    <p:spTree>
+      <p:nvGrpSpPr>
+        <p:cNvPr id="1" name=""/>
+        <p:cNvGrpSpPr/>
+        <p:nvPr/>
+      </p:nvGrpSpPr>
+      <p:grpSpPr>
+        <a:xfrm>
+          <a:off x="0" y="0"/>
+          <a:ext cx="0" cy="0"/>
+          <a:chOff x="0" y="0"/>
+          <a:chExt cx="0" cy="0"/>
+        </a:xfrm>
+      </p:grpSpPr>
+      <p:sp>
+        <p:nvSpPr>
+          <p:cNvPr id="2" name="Title 1">
+            <a:extLst>
+              <a:ext uri="{FF2B5EF4-FFF2-40B4-BE49-F238E27FC236}">
+                <a16:creationId xmlns:a16="http://schemas.microsoft.com/office/drawing/2014/main" id="{A81A99B7-EDA1-423F-9683-1DCA39190D8B}"/>
+              </a:ext>
+            </a:extLst>
+          </p:cNvPr>
+          <p:cNvSpPr>
+            <a:spLocks noGrp="1"/>
+          </p:cNvSpPr>
+          <p:nvPr>
+            <p:ph type="title"/>
+          </p:nvPr>
+        </p:nvSpPr>
+        <p:spPr/>
+        <p:txBody>
+          <a:bodyPr/>
+          <a:lstStyle/>
+          <a:p>
+            <a:r>
+              <a:rPr lang="en-US" dirty="0"/>
+              <a:t>Yeoman</a:t>
+            </a:r>
+          </a:p>
+        </p:txBody>
+      </p:sp>
+      <p:sp>
+        <p:nvSpPr>
+          <p:cNvPr id="3" name="Content Placeholder 2">
+            <a:extLst>
+              <a:ext uri="{FF2B5EF4-FFF2-40B4-BE49-F238E27FC236}">
+                <a16:creationId xmlns:a16="http://schemas.microsoft.com/office/drawing/2014/main" id="{EA4FBC21-0BA4-4C86-BF23-23883ED04F8E}"/>
+              </a:ext>
+            </a:extLst>
+          </p:cNvPr>
+          <p:cNvSpPr>
+            <a:spLocks noGrp="1"/>
+          </p:cNvSpPr>
+          <p:nvPr>
+            <p:ph idx="1"/>
+          </p:nvPr>
+        </p:nvSpPr>
+        <p:spPr/>
+        <p:txBody>
+          <a:bodyPr>
+            <a:normAutofit fontScale="62500" lnSpcReduction="20000"/>
+          </a:bodyPr>
+          <a:lstStyle/>
+          <a:p>
+            <a:r>
+              <a:rPr lang="en-US" b="1" dirty="0"/>
+              <a:t>What's Yeoman?</a:t>
+            </a:r>
+          </a:p>
+          <a:p>
+            <a:r>
+              <a:rPr lang="en-US" dirty="0"/>
+              <a:t>Yeoman helps you to kickstart new projects, prescribing best practices and tools to help you stay productive.</a:t>
+            </a:r>
+          </a:p>
+          <a:p>
+            <a:r>
+              <a:rPr lang="en-US" dirty="0"/>
+              <a:t>To do so, we provide a generator ecosystem. A generator is basically a plugin that can be run with the `</a:t>
+            </a:r>
+            <a:r>
+              <a:rPr lang="en-US" dirty="0" err="1"/>
+              <a:t>yo</a:t>
+            </a:r>
+            <a:r>
+              <a:rPr lang="en-US" dirty="0"/>
+              <a:t>` command to scaffold complete projects or useful parts.</a:t>
+            </a:r>
+          </a:p>
+          <a:p>
+            <a:r>
+              <a:rPr lang="en-US" dirty="0"/>
+              <a:t>Through our official Generators, we promote the "Yeoman workflow". This workflow is a robust and opinionated client-side stack, comprising tools and frameworks that can help developers quickly build beautiful web applications. We take care of providing everything needed to get started without any of the normal headaches associated with a manual setup.</a:t>
+            </a:r>
+          </a:p>
+          <a:p>
+            <a:r>
+              <a:rPr lang="en-US" dirty="0"/>
+              <a:t>With a modular architecture that can scale out of the box, we leverage the success and lessons learned from several open-source communities to ensure that developers use it as intelligently as possible.</a:t>
+            </a:r>
+          </a:p>
+          <a:p>
+            <a:r>
+              <a:rPr lang="en-US" dirty="0"/>
+              <a:t>As firm believers in good documentation and well thought out build processes, Yeoman includes support for linting, testing, minification and much more, so developers can focus on solutions rather than worrying about the little things.</a:t>
+            </a:r>
+          </a:p>
+          <a:p>
+            <a:r>
+              <a:rPr lang="en-US" b="1" dirty="0"/>
+              <a:t>Tools</a:t>
+            </a:r>
+          </a:p>
+          <a:p>
+            <a:r>
+              <a:rPr lang="en-US" dirty="0"/>
+              <a:t>The Yeoman workflow comprises three types of tools for improving your productivity and satisfaction when building a web app: the scaffolding tool (</a:t>
+            </a:r>
+            <a:r>
+              <a:rPr lang="en-US" dirty="0" err="1"/>
+              <a:t>yo</a:t>
+            </a:r>
+            <a:r>
+              <a:rPr lang="en-US" dirty="0"/>
+              <a:t>), the build tool (Gulp, Grunt </a:t>
+            </a:r>
+            <a:r>
+              <a:rPr lang="en-US" dirty="0" err="1"/>
+              <a:t>etc</a:t>
+            </a:r>
+            <a:r>
+              <a:rPr lang="en-US" dirty="0"/>
+              <a:t>) and the package manager (like </a:t>
+            </a:r>
+            <a:r>
+              <a:rPr lang="en-US" dirty="0" err="1"/>
+              <a:t>npm</a:t>
+            </a:r>
+            <a:r>
+              <a:rPr lang="en-US" dirty="0"/>
+              <a:t> and Bower).</a:t>
+            </a:r>
+          </a:p>
+          <a:p>
+            <a:r>
+              <a:rPr lang="en-US" sz="1600" dirty="0"/>
+              <a:t>SOURCE:</a:t>
+            </a:r>
+            <a:r>
+              <a:rPr lang="en-US" dirty="0"/>
+              <a:t> </a:t>
+            </a:r>
+            <a:r>
+              <a:rPr lang="en-US" dirty="0">
+                <a:hlinkClick r:id="rId2"/>
+              </a:rPr>
+              <a:t>https://yeoman.io</a:t>
+            </a:r>
+            <a:endParaRPr lang="en-US" dirty="0"/>
+          </a:p>
+        </p:txBody>
+      </p:sp>
+    </p:spTree>
+    <p:extLst>
+      <p:ext uri="{BB962C8B-B14F-4D97-AF65-F5344CB8AC3E}">
+        <p14:creationId xmlns:p14="http://schemas.microsoft.com/office/powerpoint/2010/main" val="3810153021"/>
       </p:ext>
     </p:extLst>
   </p:cSld>

</xml_diff>